<commit_message>
Initial commit of schema changes
</commit_message>
<xml_diff>
--- a/TileFormats/FeatureTable/figures/feature-table-binary-index.pptx
+++ b/TileFormats/FeatureTable/figures/feature-table-binary-index.pptx
@@ -3162,8 +3162,8 @@
         </p:nvSpPr>
         <p:spPr>
           <a:xfrm>
-            <a:off x="464461" y="179154"/>
-            <a:ext cx="1415772" cy="246221"/>
+            <a:off x="656823" y="179154"/>
+            <a:ext cx="1031052" cy="246221"/>
           </a:xfrm>
           <a:prstGeom prst="rect">
             <a:avLst/>
@@ -3182,11 +3182,11 @@
           <a:p>
             <a:pPr algn="ctr"/>
             <a:r>
-              <a:rPr lang="en-US" sz="1000" dirty="0" err="1" smtClean="0">
+              <a:rPr lang="en-US" sz="1000" dirty="0" smtClean="0">
                 <a:latin typeface="Courier New"/>
                 <a:cs typeface="Courier New"/>
               </a:rPr>
-              <a:t>featureTableJSON</a:t>
+              <a:t>JSON Header</a:t>
             </a:r>
             <a:endParaRPr lang="en-US" sz="1000" dirty="0">
               <a:latin typeface="Courier New"/>
@@ -3273,10 +3273,6 @@
               </a:rPr>
               <a:t>POSITION:</a:t>
             </a:r>
-            <a:endParaRPr lang="en-US" sz="1000" dirty="0" smtClean="0">
-              <a:latin typeface="Courier New"/>
-              <a:cs typeface="Courier New"/>
-            </a:endParaRPr>
           </a:p>
           <a:p>
             <a:pPr algn="ctr"/>
@@ -3469,7 +3465,7 @@
         </p:nvSpPr>
         <p:spPr>
           <a:xfrm>
-            <a:off x="4227816" y="1069856"/>
+            <a:off x="4227817" y="1058299"/>
             <a:ext cx="2414077" cy="246221"/>
           </a:xfrm>
           <a:prstGeom prst="rect">
@@ -3541,8 +3537,8 @@
         </p:nvSpPr>
         <p:spPr>
           <a:xfrm>
-            <a:off x="3000862" y="186817"/>
-            <a:ext cx="1569661" cy="246221"/>
+            <a:off x="3270168" y="186817"/>
+            <a:ext cx="1031052" cy="246221"/>
           </a:xfrm>
           <a:prstGeom prst="rect">
             <a:avLst/>
@@ -3561,11 +3557,11 @@
           <a:p>
             <a:pPr algn="ctr"/>
             <a:r>
-              <a:rPr lang="en-US" sz="1000" dirty="0" err="1" smtClean="0">
+              <a:rPr lang="en-US" sz="1000" dirty="0" smtClean="0">
                 <a:latin typeface="Courier New"/>
                 <a:cs typeface="Courier New"/>
               </a:rPr>
-              <a:t>featureTableBinary</a:t>
+              <a:t>Binary Body</a:t>
             </a:r>
             <a:endParaRPr lang="en-US" sz="1000" dirty="0">
               <a:latin typeface="Courier New"/>

</xml_diff>